<commit_message>
Resumo para cada slide  do que precisa ser feito
</commit_message>
<xml_diff>
--- a/14BDT_Business_Analytics.pptx
+++ b/14BDT_Business_Analytics.pptx
@@ -8,7 +8,11 @@
     <p:sldId id="256" r:id="rId2"/>
     <p:sldId id="257" r:id="rId3"/>
     <p:sldId id="258" r:id="rId4"/>
-    <p:sldId id="259" r:id="rId5"/>
+    <p:sldId id="260" r:id="rId5"/>
+    <p:sldId id="261" r:id="rId6"/>
+    <p:sldId id="262" r:id="rId7"/>
+    <p:sldId id="263" r:id="rId8"/>
+    <p:sldId id="264" r:id="rId9"/>
   </p:sldIdLst>
   <p:sldSz cx="12192000" cy="6858000"/>
   <p:notesSz cx="6858000" cy="9144000"/>
@@ -5176,7 +5180,7 @@
           <a:blip r:embed="rId19">
             <a:extLst>
               <a:ext uri="{28A0092B-C50C-407E-A947-70E740481C1C}">
-                <a14:useLocalDpi xmlns="" xmlns:a14="http://schemas.microsoft.com/office/drawing/2010/main" val="0"/>
+                <a14:useLocalDpi xmlns:a14="http://schemas.microsoft.com/office/drawing/2010/main" xmlns="" val="0"/>
               </a:ext>
             </a:extLst>
           </a:blip>
@@ -5205,7 +5209,7 @@
           <a:blip r:embed="rId20">
             <a:extLst>
               <a:ext uri="{28A0092B-C50C-407E-A947-70E740481C1C}">
-                <a14:useLocalDpi xmlns="" xmlns:a14="http://schemas.microsoft.com/office/drawing/2010/main" val="0"/>
+                <a14:useLocalDpi xmlns:a14="http://schemas.microsoft.com/office/drawing/2010/main" xmlns="" val="0"/>
               </a:ext>
             </a:extLst>
           </a:blip>
@@ -5297,7 +5301,7 @@
           <a:blip r:embed="rId21">
             <a:extLst>
               <a:ext uri="{28A0092B-C50C-407E-A947-70E740481C1C}">
-                <a14:useLocalDpi xmlns="" xmlns:a14="http://schemas.microsoft.com/office/drawing/2010/main" val="0"/>
+                <a14:useLocalDpi xmlns:a14="http://schemas.microsoft.com/office/drawing/2010/main" xmlns="" val="0"/>
               </a:ext>
             </a:extLst>
           </a:blip>
@@ -5326,7 +5330,7 @@
           <a:blip r:embed="rId22">
             <a:extLst>
               <a:ext uri="{28A0092B-C50C-407E-A947-70E740481C1C}">
-                <a14:useLocalDpi xmlns="" xmlns:a14="http://schemas.microsoft.com/office/drawing/2010/main" val="0"/>
+                <a14:useLocalDpi xmlns:a14="http://schemas.microsoft.com/office/drawing/2010/main" xmlns="" val="0"/>
               </a:ext>
             </a:extLst>
           </a:blip>
@@ -6118,7 +6122,7 @@
     </p:spTree>
     <p:extLst>
       <p:ext uri="{BB962C8B-B14F-4D97-AF65-F5344CB8AC3E}">
-        <p14:creationId xmlns="" xmlns:p14="http://schemas.microsoft.com/office/powerpoint/2010/main" val="4036631783"/>
+        <p14:creationId xmlns:p14="http://schemas.microsoft.com/office/powerpoint/2010/main" xmlns="" val="4036631783"/>
       </p:ext>
     </p:extLst>
   </p:cSld>
@@ -6169,77 +6173,51 @@
           <a:p>
             <a:r>
               <a:rPr lang="pt-BR" dirty="0" smtClean="0"/>
-              <a:t>Qual o alcance e profundidade das ferramentas </a:t>
-            </a:r>
-            <a:r>
-              <a:rPr lang="pt-BR" dirty="0" err="1" smtClean="0"/>
-              <a:t>Lean</a:t>
-            </a:r>
+              <a:t>Slide1 </a:t>
+            </a:r>
+            <a:r>
+              <a:rPr lang="pt-BR" dirty="0" smtClean="0">
+                <a:sym typeface="Wingdings" pitchFamily="2" charset="2"/>
+              </a:rPr>
+              <a:t> Resumo Atual da Empresa do Case </a:t>
+            </a:r>
+            <a:endParaRPr lang="en-US" dirty="0"/>
+          </a:p>
+        </p:txBody>
+      </p:sp>
+      <p:sp>
+        <p:nvSpPr>
+          <p:cNvPr id="3" name="Content Placeholder 2"/>
+          <p:cNvSpPr>
+            <a:spLocks noGrp="1"/>
+          </p:cNvSpPr>
+          <p:nvPr>
+            <p:ph idx="1"/>
+          </p:nvPr>
+        </p:nvSpPr>
+        <p:spPr/>
+        <p:txBody>
+          <a:bodyPr/>
+          <a:lstStyle/>
+          <a:p>
             <a:r>
               <a:rPr lang="pt-BR" dirty="0" smtClean="0"/>
-              <a:t>?</a:t>
-            </a:r>
-            <a:endParaRPr lang="en-US" dirty="0"/>
-          </a:p>
-        </p:txBody>
-      </p:sp>
-      <p:sp>
-        <p:nvSpPr>
-          <p:cNvPr id="3" name="Content Placeholder 2"/>
-          <p:cNvSpPr>
-            <a:spLocks noGrp="1"/>
-          </p:cNvSpPr>
-          <p:nvPr>
-            <p:ph idx="1"/>
-          </p:nvPr>
-        </p:nvSpPr>
-        <p:spPr/>
-        <p:txBody>
-          <a:bodyPr/>
-          <a:lstStyle/>
-          <a:p>
-            <a:r>
-              <a:rPr lang="pt-BR" dirty="0" smtClean="0"/>
-              <a:t>Alcance: Diversidade de setores.</a:t>
-            </a:r>
-          </a:p>
-          <a:p>
-            <a:r>
-              <a:rPr lang="pt-BR" dirty="0" smtClean="0"/>
-              <a:t>Profundidade: Ascensão hierárquica.</a:t>
-            </a:r>
-            <a:endParaRPr lang="en-US" dirty="0"/>
-          </a:p>
-        </p:txBody>
-      </p:sp>
-      <p:pic>
-        <p:nvPicPr>
-          <p:cNvPr id="4" name="Picture 3"/>
-          <p:cNvPicPr>
-            <a:picLocks noChangeAspect="1"/>
-          </p:cNvPicPr>
-          <p:nvPr/>
-        </p:nvPicPr>
-        <p:blipFill>
-          <a:blip r:embed="rId2"/>
-          <a:stretch>
-            <a:fillRect/>
-          </a:stretch>
-        </p:blipFill>
-        <p:spPr>
-          <a:xfrm>
-            <a:off x="2401390" y="2973148"/>
-            <a:ext cx="6605447" cy="3785532"/>
-          </a:xfrm>
-          <a:prstGeom prst="rect">
-            <a:avLst/>
-          </a:prstGeom>
-        </p:spPr>
-      </p:pic>
+              <a:t>Listar os Principais Problemas</a:t>
+            </a:r>
+            <a:endParaRPr lang="pt-BR" dirty="0" smtClean="0"/>
+          </a:p>
+          <a:p>
+            <a:pPr>
+              <a:buNone/>
+            </a:pPr>
+            <a:endParaRPr lang="en-US" dirty="0"/>
+          </a:p>
+        </p:txBody>
+      </p:sp>
     </p:spTree>
     <p:extLst>
       <p:ext uri="{BB962C8B-B14F-4D97-AF65-F5344CB8AC3E}">
-        <p14:creationId xmlns="" xmlns:p14="http://schemas.microsoft.com/office/powerpoint/2010/main" val="4134610484"/>
+        <p14:creationId xmlns:p14="http://schemas.microsoft.com/office/powerpoint/2010/main" xmlns="" val="4134610484"/>
       </p:ext>
     </p:extLst>
   </p:cSld>
@@ -6295,15 +6273,13 @@
           <a:p>
             <a:r>
               <a:rPr lang="pt-BR" sz="3200" dirty="0" smtClean="0"/>
-              <a:t>Correlação das ferramentas </a:t>
-            </a:r>
-            <a:r>
-              <a:rPr lang="pt-BR" sz="3200" dirty="0" err="1" smtClean="0"/>
-              <a:t>Lean</a:t>
-            </a:r>
-            <a:r>
-              <a:rPr lang="pt-BR" sz="3200" dirty="0" smtClean="0"/>
-              <a:t> com as 6 competências-chave necessárias aos três componentes principais do Big Data (Uso de dados, Motor de dados e ecossistema de dados)</a:t>
+              <a:t>Slide 2 </a:t>
+            </a:r>
+            <a:r>
+              <a:rPr lang="pt-BR" sz="3200" dirty="0" smtClean="0">
+                <a:sym typeface="Wingdings" pitchFamily="2" charset="2"/>
+              </a:rPr>
+              <a:t> Onde o Case quer chegar</a:t>
             </a:r>
             <a:endParaRPr lang="en-US" sz="3200" dirty="0"/>
           </a:p>
@@ -6331,54 +6307,32 @@
           <a:p>
             <a:r>
               <a:rPr lang="pt-BR" dirty="0" smtClean="0"/>
-              <a:t>Identificar oportunidades: Valorizar as pessoas.</a:t>
+              <a:t>O que a empresa precisa melhorar </a:t>
             </a:r>
           </a:p>
           <a:p>
             <a:r>
               <a:rPr lang="pt-BR" dirty="0" smtClean="0"/>
-              <a:t>Construir confiança: Dar valor a necessidade do cliente.</a:t>
-            </a:r>
-          </a:p>
-          <a:p>
-            <a:r>
-              <a:rPr lang="pt-BR" dirty="0" smtClean="0"/>
-              <a:t>Estabelecer uma plataforma: Aumento de valor através da diminuição do custo.</a:t>
-            </a:r>
-            <a:endParaRPr lang="en-US" dirty="0" smtClean="0"/>
-          </a:p>
-          <a:p>
-            <a:r>
-              <a:rPr lang="pt-BR" dirty="0" smtClean="0"/>
-              <a:t>Moldar a organização: Expor problemas e achar suas causas.</a:t>
-            </a:r>
-          </a:p>
-          <a:p>
-            <a:r>
-              <a:rPr lang="pt-BR" dirty="0" smtClean="0"/>
-              <a:t>Participar de um ecossistema: Identificar valor na informação.</a:t>
-            </a:r>
-          </a:p>
-          <a:p>
-            <a:r>
-              <a:rPr lang="pt-BR" dirty="0" smtClean="0"/>
-              <a:t>Fazer os relacionamentos funcionarem: </a:t>
+              <a:t>Exemplo: Faturamento, participação de mercado </a:t>
             </a:r>
             <a:r>
               <a:rPr lang="pt-BR" dirty="0" err="1" smtClean="0"/>
-              <a:t>Kaizen</a:t>
-            </a:r>
-            <a:r>
-              <a:rPr lang="pt-BR" dirty="0" smtClean="0"/>
-              <a:t>.</a:t>
-            </a:r>
+              <a:t>etc</a:t>
+            </a:r>
+            <a:endParaRPr lang="pt-BR" dirty="0" smtClean="0"/>
+          </a:p>
+          <a:p>
+            <a:pPr>
+              <a:buNone/>
+            </a:pPr>
+            <a:endParaRPr lang="pt-BR" dirty="0" smtClean="0"/>
           </a:p>
         </p:txBody>
       </p:sp>
     </p:spTree>
     <p:extLst>
       <p:ext uri="{BB962C8B-B14F-4D97-AF65-F5344CB8AC3E}">
-        <p14:creationId xmlns="" xmlns:p14="http://schemas.microsoft.com/office/powerpoint/2010/main" val="487987655"/>
+        <p14:creationId xmlns:p14="http://schemas.microsoft.com/office/powerpoint/2010/main" xmlns="" val="487987655"/>
       </p:ext>
     </p:extLst>
   </p:cSld>
@@ -6414,7 +6368,7 @@
       </p:grpSpPr>
       <p:sp>
         <p:nvSpPr>
-          <p:cNvPr id="2" name="Título 1"/>
+          <p:cNvPr id="2" name="Title 1"/>
           <p:cNvSpPr>
             <a:spLocks noGrp="1"/>
           </p:cNvSpPr>
@@ -6422,18 +6376,33 @@
             <p:ph type="title"/>
           </p:nvPr>
         </p:nvSpPr>
-        <p:spPr/>
-        <p:txBody>
-          <a:bodyPr/>
-          <a:lstStyle/>
-          <a:p>
-            <a:endParaRPr lang="pt-BR"/>
-          </a:p>
-        </p:txBody>
-      </p:sp>
-      <p:sp>
-        <p:nvSpPr>
-          <p:cNvPr id="3" name="Marcador de Posição de Conteúdo 2"/>
+        <p:spPr>
+          <a:xfrm>
+            <a:off x="646111" y="452718"/>
+            <a:ext cx="10169935" cy="1400530"/>
+          </a:xfrm>
+        </p:spPr>
+        <p:txBody>
+          <a:bodyPr/>
+          <a:lstStyle/>
+          <a:p>
+            <a:r>
+              <a:rPr lang="pt-BR" sz="3200" dirty="0" smtClean="0"/>
+              <a:t>Slide 3 </a:t>
+            </a:r>
+            <a:r>
+              <a:rPr lang="pt-BR" sz="3200" dirty="0" smtClean="0">
+                <a:sym typeface="Wingdings" pitchFamily="2" charset="2"/>
+              </a:rPr>
+              <a:t> Abordagem Analítica</a:t>
+            </a:r>
+            <a:endParaRPr lang="en-US" sz="3200" dirty="0"/>
+          </a:p>
+        </p:txBody>
+      </p:sp>
+      <p:sp>
+        <p:nvSpPr>
+          <p:cNvPr id="3" name="Content Placeholder 2"/>
           <p:cNvSpPr>
             <a:spLocks noGrp="1"/>
           </p:cNvSpPr>
@@ -6441,42 +6410,487 @@
             <p:ph idx="1"/>
           </p:nvPr>
         </p:nvSpPr>
-        <p:spPr/>
-        <p:txBody>
-          <a:bodyPr>
-            <a:normAutofit/>
-          </a:bodyPr>
+        <p:spPr>
+          <a:xfrm>
+            <a:off x="1090249" y="1229958"/>
+            <a:ext cx="8946541" cy="4195481"/>
+          </a:xfrm>
+        </p:spPr>
+        <p:txBody>
+          <a:bodyPr/>
           <a:lstStyle/>
           <a:p>
             <a:pPr>
               <a:buNone/>
             </a:pPr>
-            <a:endParaRPr lang="pt-BR" sz="3200" dirty="0" smtClean="0">
-              <a:solidFill>
-                <a:schemeClr val="tx2"/>
-              </a:solidFill>
-            </a:endParaRPr>
-          </a:p>
-          <a:p>
-            <a:pPr>
-              <a:buNone/>
-            </a:pPr>
-            <a:r>
-              <a:rPr lang="pt-BR" sz="3200" dirty="0" smtClean="0">
-                <a:solidFill>
-                  <a:schemeClr val="tx2"/>
-                </a:solidFill>
-              </a:rPr>
-              <a:t>								Obrigado!</a:t>
-            </a:r>
+            <a:endParaRPr lang="pt-BR" dirty="0" smtClean="0"/>
+          </a:p>
+          <a:p>
+            <a:r>
+              <a:rPr lang="pt-BR" dirty="0" smtClean="0"/>
+              <a:t>Que  </a:t>
+            </a:r>
+            <a:r>
+              <a:rPr lang="pt-BR" dirty="0" smtClean="0"/>
+              <a:t>e</a:t>
+            </a:r>
+            <a:r>
+              <a:rPr lang="pt-BR" dirty="0" smtClean="0"/>
+              <a:t> Como ? Usar BI, BA e Big Data</a:t>
+            </a:r>
+            <a:endParaRPr lang="pt-BR" dirty="0" smtClean="0"/>
           </a:p>
         </p:txBody>
       </p:sp>
     </p:spTree>
+    <p:extLst>
+      <p:ext uri="{BB962C8B-B14F-4D97-AF65-F5344CB8AC3E}">
+        <p14:creationId xmlns:p14="http://schemas.microsoft.com/office/powerpoint/2010/main" xmlns="" val="487987655"/>
+      </p:ext>
+    </p:extLst>
   </p:cSld>
   <p:clrMapOvr>
     <a:masterClrMapping/>
   </p:clrMapOvr>
+  <p:timing>
+    <p:tnLst>
+      <p:par>
+        <p:cTn id="1" dur="indefinite" restart="never" nodeType="tmRoot"/>
+      </p:par>
+    </p:tnLst>
+  </p:timing>
+</p:sld>
+</file>
+
+<file path=ppt/slides/slide5.xml><?xml version="1.0" encoding="utf-8"?>
+<p:sld xmlns:a="http://schemas.openxmlformats.org/drawingml/2006/main" xmlns:r="http://schemas.openxmlformats.org/officeDocument/2006/relationships" xmlns:p="http://schemas.openxmlformats.org/presentationml/2006/main">
+  <p:cSld>
+    <p:spTree>
+      <p:nvGrpSpPr>
+        <p:cNvPr id="1" name=""/>
+        <p:cNvGrpSpPr/>
+        <p:nvPr/>
+      </p:nvGrpSpPr>
+      <p:grpSpPr>
+        <a:xfrm>
+          <a:off x="0" y="0"/>
+          <a:ext cx="0" cy="0"/>
+          <a:chOff x="0" y="0"/>
+          <a:chExt cx="0" cy="0"/>
+        </a:xfrm>
+      </p:grpSpPr>
+      <p:sp>
+        <p:nvSpPr>
+          <p:cNvPr id="2" name="Title 1"/>
+          <p:cNvSpPr>
+            <a:spLocks noGrp="1"/>
+          </p:cNvSpPr>
+          <p:nvPr>
+            <p:ph type="title"/>
+          </p:nvPr>
+        </p:nvSpPr>
+        <p:spPr>
+          <a:xfrm>
+            <a:off x="646111" y="452718"/>
+            <a:ext cx="10169935" cy="1400530"/>
+          </a:xfrm>
+        </p:spPr>
+        <p:txBody>
+          <a:bodyPr/>
+          <a:lstStyle/>
+          <a:p>
+            <a:r>
+              <a:rPr lang="pt-BR" sz="3200" dirty="0" smtClean="0"/>
+              <a:t>Slide 4 </a:t>
+            </a:r>
+            <a:r>
+              <a:rPr lang="pt-BR" sz="3200" dirty="0" smtClean="0">
+                <a:sym typeface="Wingdings" pitchFamily="2" charset="2"/>
+              </a:rPr>
+              <a:t>Arquitetura proposta </a:t>
+            </a:r>
+            <a:endParaRPr lang="en-US" sz="3200" dirty="0"/>
+          </a:p>
+        </p:txBody>
+      </p:sp>
+      <p:sp>
+        <p:nvSpPr>
+          <p:cNvPr id="3" name="Content Placeholder 2"/>
+          <p:cNvSpPr>
+            <a:spLocks noGrp="1"/>
+          </p:cNvSpPr>
+          <p:nvPr>
+            <p:ph idx="1"/>
+          </p:nvPr>
+        </p:nvSpPr>
+        <p:spPr>
+          <a:xfrm>
+            <a:off x="1090249" y="1229958"/>
+            <a:ext cx="8946541" cy="4195481"/>
+          </a:xfrm>
+        </p:spPr>
+        <p:txBody>
+          <a:bodyPr/>
+          <a:lstStyle/>
+          <a:p>
+            <a:pPr>
+              <a:buNone/>
+            </a:pPr>
+            <a:endParaRPr lang="pt-BR" dirty="0" smtClean="0"/>
+          </a:p>
+          <a:p>
+            <a:r>
+              <a:rPr lang="pt-BR" dirty="0" smtClean="0"/>
+              <a:t>Usar BI, BA e Big Data</a:t>
+            </a:r>
+            <a:endParaRPr lang="pt-BR" dirty="0" smtClean="0"/>
+          </a:p>
+        </p:txBody>
+      </p:sp>
+    </p:spTree>
+    <p:extLst>
+      <p:ext uri="{BB962C8B-B14F-4D97-AF65-F5344CB8AC3E}">
+        <p14:creationId xmlns:p14="http://schemas.microsoft.com/office/powerpoint/2010/main" xmlns="" val="487987655"/>
+      </p:ext>
+    </p:extLst>
+  </p:cSld>
+  <p:clrMapOvr>
+    <a:masterClrMapping/>
+  </p:clrMapOvr>
+  <p:timing>
+    <p:tnLst>
+      <p:par>
+        <p:cTn id="1" dur="indefinite" restart="never" nodeType="tmRoot"/>
+      </p:par>
+    </p:tnLst>
+  </p:timing>
+</p:sld>
+</file>
+
+<file path=ppt/slides/slide6.xml><?xml version="1.0" encoding="utf-8"?>
+<p:sld xmlns:a="http://schemas.openxmlformats.org/drawingml/2006/main" xmlns:r="http://schemas.openxmlformats.org/officeDocument/2006/relationships" xmlns:p="http://schemas.openxmlformats.org/presentationml/2006/main">
+  <p:cSld>
+    <p:spTree>
+      <p:nvGrpSpPr>
+        <p:cNvPr id="1" name=""/>
+        <p:cNvGrpSpPr/>
+        <p:nvPr/>
+      </p:nvGrpSpPr>
+      <p:grpSpPr>
+        <a:xfrm>
+          <a:off x="0" y="0"/>
+          <a:ext cx="0" cy="0"/>
+          <a:chOff x="0" y="0"/>
+          <a:chExt cx="0" cy="0"/>
+        </a:xfrm>
+      </p:grpSpPr>
+      <p:sp>
+        <p:nvSpPr>
+          <p:cNvPr id="2" name="Title 1"/>
+          <p:cNvSpPr>
+            <a:spLocks noGrp="1"/>
+          </p:cNvSpPr>
+          <p:nvPr>
+            <p:ph type="title"/>
+          </p:nvPr>
+        </p:nvSpPr>
+        <p:spPr>
+          <a:xfrm>
+            <a:off x="646111" y="452718"/>
+            <a:ext cx="10169935" cy="1400530"/>
+          </a:xfrm>
+        </p:spPr>
+        <p:txBody>
+          <a:bodyPr/>
+          <a:lstStyle/>
+          <a:p>
+            <a:r>
+              <a:rPr lang="pt-BR" sz="3200" dirty="0" smtClean="0"/>
+              <a:t>Slide 5 </a:t>
+            </a:r>
+            <a:r>
+              <a:rPr lang="pt-BR" sz="3200" dirty="0" smtClean="0">
+                <a:sym typeface="Wingdings" pitchFamily="2" charset="2"/>
+              </a:rPr>
+              <a:t> Benefícios em adotar a nova arquitetura </a:t>
+            </a:r>
+            <a:endParaRPr lang="en-US" sz="3200" dirty="0"/>
+          </a:p>
+        </p:txBody>
+      </p:sp>
+      <p:sp>
+        <p:nvSpPr>
+          <p:cNvPr id="3" name="Content Placeholder 2"/>
+          <p:cNvSpPr>
+            <a:spLocks noGrp="1"/>
+          </p:cNvSpPr>
+          <p:nvPr>
+            <p:ph idx="1"/>
+          </p:nvPr>
+        </p:nvSpPr>
+        <p:spPr>
+          <a:xfrm>
+            <a:off x="1090249" y="1229958"/>
+            <a:ext cx="8946541" cy="4195481"/>
+          </a:xfrm>
+        </p:spPr>
+        <p:txBody>
+          <a:bodyPr/>
+          <a:lstStyle/>
+          <a:p>
+            <a:pPr>
+              <a:buNone/>
+            </a:pPr>
+            <a:endParaRPr lang="pt-BR" dirty="0" smtClean="0"/>
+          </a:p>
+          <a:p>
+            <a:r>
+              <a:rPr lang="pt-BR" dirty="0" smtClean="0"/>
+              <a:t>Por quê usar BI, BA e Big Data</a:t>
+            </a:r>
+            <a:endParaRPr lang="pt-BR" dirty="0" smtClean="0"/>
+          </a:p>
+        </p:txBody>
+      </p:sp>
+    </p:spTree>
+    <p:extLst>
+      <p:ext uri="{BB962C8B-B14F-4D97-AF65-F5344CB8AC3E}">
+        <p14:creationId xmlns:p14="http://schemas.microsoft.com/office/powerpoint/2010/main" xmlns="" val="487987655"/>
+      </p:ext>
+    </p:extLst>
+  </p:cSld>
+  <p:clrMapOvr>
+    <a:masterClrMapping/>
+  </p:clrMapOvr>
+  <p:timing>
+    <p:tnLst>
+      <p:par>
+        <p:cTn id="1" dur="indefinite" restart="never" nodeType="tmRoot"/>
+      </p:par>
+    </p:tnLst>
+  </p:timing>
+</p:sld>
+</file>
+
+<file path=ppt/slides/slide7.xml><?xml version="1.0" encoding="utf-8"?>
+<p:sld xmlns:a="http://schemas.openxmlformats.org/drawingml/2006/main" xmlns:r="http://schemas.openxmlformats.org/officeDocument/2006/relationships" xmlns:p="http://schemas.openxmlformats.org/presentationml/2006/main">
+  <p:cSld>
+    <p:spTree>
+      <p:nvGrpSpPr>
+        <p:cNvPr id="1" name=""/>
+        <p:cNvGrpSpPr/>
+        <p:nvPr/>
+      </p:nvGrpSpPr>
+      <p:grpSpPr>
+        <a:xfrm>
+          <a:off x="0" y="0"/>
+          <a:ext cx="0" cy="0"/>
+          <a:chOff x="0" y="0"/>
+          <a:chExt cx="0" cy="0"/>
+        </a:xfrm>
+      </p:grpSpPr>
+      <p:sp>
+        <p:nvSpPr>
+          <p:cNvPr id="2" name="Title 1"/>
+          <p:cNvSpPr>
+            <a:spLocks noGrp="1"/>
+          </p:cNvSpPr>
+          <p:nvPr>
+            <p:ph type="title"/>
+          </p:nvPr>
+        </p:nvSpPr>
+        <p:spPr>
+          <a:xfrm>
+            <a:off x="646111" y="452718"/>
+            <a:ext cx="10169935" cy="1400530"/>
+          </a:xfrm>
+        </p:spPr>
+        <p:txBody>
+          <a:bodyPr/>
+          <a:lstStyle/>
+          <a:p>
+            <a:r>
+              <a:rPr lang="pt-BR" sz="3200" dirty="0" smtClean="0"/>
+              <a:t>Slide 6 </a:t>
+            </a:r>
+            <a:r>
+              <a:rPr lang="pt-BR" sz="3200" dirty="0" smtClean="0">
+                <a:sym typeface="Wingdings" pitchFamily="2" charset="2"/>
+              </a:rPr>
+              <a:t> </a:t>
+            </a:r>
+            <a:r>
+              <a:rPr lang="pt-BR" sz="3200" dirty="0" err="1" smtClean="0">
+                <a:sym typeface="Wingdings" pitchFamily="2" charset="2"/>
+              </a:rPr>
+              <a:t>TimeFrame</a:t>
+            </a:r>
+            <a:r>
+              <a:rPr lang="pt-BR" sz="3200" dirty="0" smtClean="0">
+                <a:sym typeface="Wingdings" pitchFamily="2" charset="2"/>
+              </a:rPr>
+              <a:t> (Cronograma)</a:t>
+            </a:r>
+            <a:endParaRPr lang="en-US" sz="3200" dirty="0"/>
+          </a:p>
+        </p:txBody>
+      </p:sp>
+      <p:sp>
+        <p:nvSpPr>
+          <p:cNvPr id="3" name="Content Placeholder 2"/>
+          <p:cNvSpPr>
+            <a:spLocks noGrp="1"/>
+          </p:cNvSpPr>
+          <p:nvPr>
+            <p:ph idx="1"/>
+          </p:nvPr>
+        </p:nvSpPr>
+        <p:spPr>
+          <a:xfrm>
+            <a:off x="1090249" y="1229958"/>
+            <a:ext cx="8946541" cy="4195481"/>
+          </a:xfrm>
+        </p:spPr>
+        <p:txBody>
+          <a:bodyPr/>
+          <a:lstStyle/>
+          <a:p>
+            <a:pPr>
+              <a:buNone/>
+            </a:pPr>
+            <a:endParaRPr lang="pt-BR" dirty="0" smtClean="0"/>
+          </a:p>
+          <a:p>
+            <a:r>
+              <a:rPr lang="pt-BR" dirty="0" smtClean="0"/>
+              <a:t>Equipe necessária + custos + prazo</a:t>
+            </a:r>
+            <a:endParaRPr lang="pt-BR" dirty="0" smtClean="0"/>
+          </a:p>
+        </p:txBody>
+      </p:sp>
+    </p:spTree>
+    <p:extLst>
+      <p:ext uri="{BB962C8B-B14F-4D97-AF65-F5344CB8AC3E}">
+        <p14:creationId xmlns:p14="http://schemas.microsoft.com/office/powerpoint/2010/main" xmlns="" val="487987655"/>
+      </p:ext>
+    </p:extLst>
+  </p:cSld>
+  <p:clrMapOvr>
+    <a:masterClrMapping/>
+  </p:clrMapOvr>
+  <p:timing>
+    <p:tnLst>
+      <p:par>
+        <p:cTn id="1" dur="indefinite" restart="never" nodeType="tmRoot"/>
+      </p:par>
+    </p:tnLst>
+  </p:timing>
+</p:sld>
+</file>
+
+<file path=ppt/slides/slide8.xml><?xml version="1.0" encoding="utf-8"?>
+<p:sld xmlns:a="http://schemas.openxmlformats.org/drawingml/2006/main" xmlns:r="http://schemas.openxmlformats.org/officeDocument/2006/relationships" xmlns:p="http://schemas.openxmlformats.org/presentationml/2006/main">
+  <p:cSld>
+    <p:spTree>
+      <p:nvGrpSpPr>
+        <p:cNvPr id="1" name=""/>
+        <p:cNvGrpSpPr/>
+        <p:nvPr/>
+      </p:nvGrpSpPr>
+      <p:grpSpPr>
+        <a:xfrm>
+          <a:off x="0" y="0"/>
+          <a:ext cx="0" cy="0"/>
+          <a:chOff x="0" y="0"/>
+          <a:chExt cx="0" cy="0"/>
+        </a:xfrm>
+      </p:grpSpPr>
+      <p:sp>
+        <p:nvSpPr>
+          <p:cNvPr id="2" name="Title 1"/>
+          <p:cNvSpPr>
+            <a:spLocks noGrp="1"/>
+          </p:cNvSpPr>
+          <p:nvPr>
+            <p:ph type="title"/>
+          </p:nvPr>
+        </p:nvSpPr>
+        <p:spPr>
+          <a:xfrm>
+            <a:off x="646111" y="452718"/>
+            <a:ext cx="10169935" cy="1400530"/>
+          </a:xfrm>
+        </p:spPr>
+        <p:txBody>
+          <a:bodyPr/>
+          <a:lstStyle/>
+          <a:p>
+            <a:r>
+              <a:rPr lang="pt-BR" sz="3200" dirty="0" smtClean="0"/>
+              <a:t>Slide 7 </a:t>
+            </a:r>
+            <a:r>
+              <a:rPr lang="pt-BR" sz="3200" dirty="0" smtClean="0">
+                <a:sym typeface="Wingdings" pitchFamily="2" charset="2"/>
+              </a:rPr>
+              <a:t> Conclusão </a:t>
+            </a:r>
+            <a:endParaRPr lang="en-US" sz="3200" dirty="0"/>
+          </a:p>
+        </p:txBody>
+      </p:sp>
+      <p:sp>
+        <p:nvSpPr>
+          <p:cNvPr id="3" name="Content Placeholder 2"/>
+          <p:cNvSpPr>
+            <a:spLocks noGrp="1"/>
+          </p:cNvSpPr>
+          <p:nvPr>
+            <p:ph idx="1"/>
+          </p:nvPr>
+        </p:nvSpPr>
+        <p:spPr>
+          <a:xfrm>
+            <a:off x="1090249" y="1229958"/>
+            <a:ext cx="8946541" cy="4195481"/>
+          </a:xfrm>
+        </p:spPr>
+        <p:txBody>
+          <a:bodyPr/>
+          <a:lstStyle/>
+          <a:p>
+            <a:pPr>
+              <a:buNone/>
+            </a:pPr>
+            <a:endParaRPr lang="pt-BR" dirty="0" smtClean="0"/>
+          </a:p>
+          <a:p>
+            <a:r>
+              <a:rPr lang="pt-BR" dirty="0" smtClean="0"/>
+              <a:t>Frase de efeito !!!</a:t>
+            </a:r>
+            <a:endParaRPr lang="pt-BR" dirty="0" smtClean="0"/>
+          </a:p>
+        </p:txBody>
+      </p:sp>
+    </p:spTree>
+    <p:extLst>
+      <p:ext uri="{BB962C8B-B14F-4D97-AF65-F5344CB8AC3E}">
+        <p14:creationId xmlns:p14="http://schemas.microsoft.com/office/powerpoint/2010/main" xmlns="" val="487987655"/>
+      </p:ext>
+    </p:extLst>
+  </p:cSld>
+  <p:clrMapOvr>
+    <a:masterClrMapping/>
+  </p:clrMapOvr>
+  <p:timing>
+    <p:tnLst>
+      <p:par>
+        <p:cTn id="1" dur="indefinite" restart="never" nodeType="tmRoot"/>
+      </p:par>
+    </p:tnLst>
+  </p:timing>
 </p:sld>
 </file>
 
@@ -6740,7 +7154,7 @@
   <a:extraClrSchemeLst/>
   <a:extLst>
     <a:ext uri="{05A4C25C-085E-4340-85A3-A5531E510DB2}">
-      <thm15:themeFamily xmlns="" xmlns:thm15="http://schemas.microsoft.com/office/thememl/2012/main" name="Ion" id="{B8441ADB-2E43-4AF7-B97A-BD870242C6A8}" vid="{292E63A9-BB86-4E3D-B92A-7223C6510D2E}"/>
+      <thm15:themeFamily xmlns:thm15="http://schemas.microsoft.com/office/thememl/2012/main" xmlns="" name="Ion" id="{B8441ADB-2E43-4AF7-B97A-BD870242C6A8}" vid="{292E63A9-BB86-4E3D-B92A-7223C6510D2E}"/>
     </a:ext>
   </a:extLst>
 </a:theme>

</xml_diff>